<commit_message>
Adding Feature Data Methods
Trying to read feature data for the future DFM routine
</commit_message>
<xml_diff>
--- a/Weekly Updates/Week2.pptx
+++ b/Weekly Updates/Week2.pptx
@@ -8,11 +8,14 @@
     <p:sldId id="256" r:id="rId2"/>
     <p:sldId id="263" r:id="rId3"/>
     <p:sldId id="259" r:id="rId4"/>
-    <p:sldId id="262" r:id="rId5"/>
-    <p:sldId id="265" r:id="rId6"/>
-    <p:sldId id="260" r:id="rId7"/>
-    <p:sldId id="261" r:id="rId8"/>
-    <p:sldId id="264" r:id="rId9"/>
+    <p:sldId id="267" r:id="rId5"/>
+    <p:sldId id="268" r:id="rId6"/>
+    <p:sldId id="262" r:id="rId7"/>
+    <p:sldId id="265" r:id="rId8"/>
+    <p:sldId id="260" r:id="rId9"/>
+    <p:sldId id="261" r:id="rId10"/>
+    <p:sldId id="264" r:id="rId11"/>
+    <p:sldId id="266" r:id="rId12"/>
   </p:sldIdLst>
   <p:sldSz cx="12192000" cy="6858000"/>
   <p:notesSz cx="6858000" cy="9144000"/>
@@ -3356,6 +3359,10 @@
           </a:bodyPr>
           <a:lstStyle/>
           <a:p>
+            <a:r>
+              <a:rPr lang="en-US" dirty="0"/>
+              <a:t/>
+            </a:r>
             <a:br>
               <a:rPr lang="en-US" dirty="0"/>
             </a:br>
@@ -3417,6 +3424,211 @@
     <p:extLst>
       <p:ext uri="{BB962C8B-B14F-4D97-AF65-F5344CB8AC3E}">
         <p14:creationId xmlns:p14="http://schemas.microsoft.com/office/powerpoint/2010/main" val="3085121952"/>
+      </p:ext>
+    </p:extLst>
+  </p:cSld>
+  <p:clrMapOvr>
+    <a:masterClrMapping/>
+  </p:clrMapOvr>
+</p:sld>
+</file>
+
+<file path=ppt/slides/slide10.xml><?xml version="1.0" encoding="utf-8"?>
+<p:sld xmlns:a="http://schemas.openxmlformats.org/drawingml/2006/main" xmlns:r="http://schemas.openxmlformats.org/officeDocument/2006/relationships" xmlns:p="http://schemas.openxmlformats.org/presentationml/2006/main">
+  <p:cSld>
+    <p:spTree>
+      <p:nvGrpSpPr>
+        <p:cNvPr id="1" name=""/>
+        <p:cNvGrpSpPr/>
+        <p:nvPr/>
+      </p:nvGrpSpPr>
+      <p:grpSpPr>
+        <a:xfrm>
+          <a:off x="0" y="0"/>
+          <a:ext cx="0" cy="0"/>
+          <a:chOff x="0" y="0"/>
+          <a:chExt cx="0" cy="0"/>
+        </a:xfrm>
+      </p:grpSpPr>
+      <p:sp>
+        <p:nvSpPr>
+          <p:cNvPr id="2" name="Title 1">
+            <a:extLst>
+              <a:ext uri="{FF2B5EF4-FFF2-40B4-BE49-F238E27FC236}">
+                <a16:creationId xmlns:a16="http://schemas.microsoft.com/office/drawing/2014/main" id="{5EF4F688-E0AF-4FB6-89E1-31ACE46128F1}"/>
+              </a:ext>
+            </a:extLst>
+          </p:cNvPr>
+          <p:cNvSpPr>
+            <a:spLocks noGrp="1"/>
+          </p:cNvSpPr>
+          <p:nvPr>
+            <p:ph type="title"/>
+          </p:nvPr>
+        </p:nvSpPr>
+        <p:spPr/>
+        <p:txBody>
+          <a:bodyPr/>
+          <a:lstStyle/>
+          <a:p>
+            <a:r>
+              <a:rPr lang="en-US" dirty="0"/>
+              <a:t>Problems List and Solution (Cont’d)</a:t>
+            </a:r>
+          </a:p>
+        </p:txBody>
+      </p:sp>
+      <p:sp>
+        <p:nvSpPr>
+          <p:cNvPr id="3" name="Content Placeholder 2">
+            <a:extLst>
+              <a:ext uri="{FF2B5EF4-FFF2-40B4-BE49-F238E27FC236}">
+                <a16:creationId xmlns:a16="http://schemas.microsoft.com/office/drawing/2014/main" id="{B4C844F7-E960-4048-BB55-A40BA7FDB0FD}"/>
+              </a:ext>
+            </a:extLst>
+          </p:cNvPr>
+          <p:cNvSpPr>
+            <a:spLocks noGrp="1"/>
+          </p:cNvSpPr>
+          <p:nvPr>
+            <p:ph idx="1"/>
+          </p:nvPr>
+        </p:nvSpPr>
+        <p:spPr/>
+        <p:txBody>
+          <a:bodyPr/>
+          <a:lstStyle/>
+          <a:p>
+            <a:r>
+              <a:rPr lang="en-US" dirty="0"/>
+              <a:t>Make sure SolidWorks Interop files (SolidWorks Native API) have the same version as those referenced by AngelSix API</a:t>
+            </a:r>
+          </a:p>
+          <a:p>
+            <a:endParaRPr lang="en-US" dirty="0"/>
+          </a:p>
+          <a:p>
+            <a:r>
+              <a:rPr lang="en-US" dirty="0"/>
+              <a:t>AngelSix API uses .NET Framework 4.7.1, so make sure this is consistent with your solution</a:t>
+            </a:r>
+          </a:p>
+        </p:txBody>
+      </p:sp>
+    </p:spTree>
+    <p:extLst>
+      <p:ext uri="{BB962C8B-B14F-4D97-AF65-F5344CB8AC3E}">
+        <p14:creationId xmlns:p14="http://schemas.microsoft.com/office/powerpoint/2010/main" val="790591578"/>
+      </p:ext>
+    </p:extLst>
+  </p:cSld>
+  <p:clrMapOvr>
+    <a:masterClrMapping/>
+  </p:clrMapOvr>
+</p:sld>
+</file>
+
+<file path=ppt/slides/slide11.xml><?xml version="1.0" encoding="utf-8"?>
+<p:sld xmlns:a="http://schemas.openxmlformats.org/drawingml/2006/main" xmlns:r="http://schemas.openxmlformats.org/officeDocument/2006/relationships" xmlns:p="http://schemas.openxmlformats.org/presentationml/2006/main">
+  <p:cSld>
+    <p:spTree>
+      <p:nvGrpSpPr>
+        <p:cNvPr id="1" name=""/>
+        <p:cNvGrpSpPr/>
+        <p:nvPr/>
+      </p:nvGrpSpPr>
+      <p:grpSpPr>
+        <a:xfrm>
+          <a:off x="0" y="0"/>
+          <a:ext cx="0" cy="0"/>
+          <a:chOff x="0" y="0"/>
+          <a:chExt cx="0" cy="0"/>
+        </a:xfrm>
+      </p:grpSpPr>
+      <p:sp>
+        <p:nvSpPr>
+          <p:cNvPr id="2" name="Title 1"/>
+          <p:cNvSpPr>
+            <a:spLocks noGrp="1"/>
+          </p:cNvSpPr>
+          <p:nvPr>
+            <p:ph type="title"/>
+          </p:nvPr>
+        </p:nvSpPr>
+        <p:spPr/>
+        <p:txBody>
+          <a:bodyPr/>
+          <a:lstStyle/>
+          <a:p>
+            <a:r>
+              <a:rPr lang="en-US" dirty="0"/>
+              <a:t>Problems List and Solution (Cont’d)</a:t>
+            </a:r>
+          </a:p>
+        </p:txBody>
+      </p:sp>
+      <p:sp>
+        <p:nvSpPr>
+          <p:cNvPr id="3" name="Content Placeholder 2"/>
+          <p:cNvSpPr>
+            <a:spLocks noGrp="1"/>
+          </p:cNvSpPr>
+          <p:nvPr>
+            <p:ph idx="1"/>
+          </p:nvPr>
+        </p:nvSpPr>
+        <p:spPr/>
+        <p:txBody>
+          <a:bodyPr/>
+          <a:lstStyle/>
+          <a:p>
+            <a:r>
+              <a:rPr lang="en-US" dirty="0" smtClean="0"/>
+              <a:t>Installing add-in shows too many Command Manager Items</a:t>
+            </a:r>
+          </a:p>
+          <a:p>
+            <a:endParaRPr lang="en-US" dirty="0"/>
+          </a:p>
+          <a:p>
+            <a:r>
+              <a:rPr lang="en-US" dirty="0" smtClean="0"/>
+              <a:t>Renaming the project when you have a Command Manager Item plug-in causes this</a:t>
+            </a:r>
+          </a:p>
+          <a:p>
+            <a:endParaRPr lang="en-US" dirty="0"/>
+          </a:p>
+          <a:p>
+            <a:r>
+              <a:rPr lang="en-US" dirty="0" smtClean="0"/>
+              <a:t>Have not found the fix so far</a:t>
+            </a:r>
+          </a:p>
+          <a:p>
+            <a:endParaRPr lang="en-US" dirty="0"/>
+          </a:p>
+          <a:p>
+            <a:r>
+              <a:rPr lang="en-US" dirty="0" smtClean="0"/>
+              <a:t>Possible walk-around: clone the project, and export a new .</a:t>
+            </a:r>
+            <a:r>
+              <a:rPr lang="en-US" dirty="0" err="1" smtClean="0"/>
+              <a:t>dll</a:t>
+            </a:r>
+            <a:r>
+              <a:rPr lang="en-US" dirty="0" smtClean="0"/>
+              <a:t> </a:t>
+            </a:r>
+            <a:endParaRPr lang="en-US" dirty="0"/>
+          </a:p>
+        </p:txBody>
+      </p:sp>
+    </p:spTree>
+    <p:extLst>
+      <p:ext uri="{BB962C8B-B14F-4D97-AF65-F5344CB8AC3E}">
+        <p14:creationId xmlns:p14="http://schemas.microsoft.com/office/powerpoint/2010/main" val="2651655616"/>
       </p:ext>
     </p:extLst>
   </p:cSld>
@@ -3524,8 +3736,20 @@
             </a:pPr>
             <a:r>
               <a:rPr lang="en-US" dirty="0"/>
-              <a:t>Picture import functionality has been added</a:t>
-            </a:r>
+              <a:t>Picture import functionality has been </a:t>
+            </a:r>
+            <a:r>
+              <a:rPr lang="en-US" dirty="0" smtClean="0"/>
+              <a:t>added</a:t>
+            </a:r>
+          </a:p>
+          <a:p>
+            <a:pPr lvl="1"/>
+            <a:r>
+              <a:rPr lang="en-US" dirty="0" smtClean="0"/>
+              <a:t>See Demo</a:t>
+            </a:r>
+            <a:endParaRPr lang="en-US" dirty="0"/>
           </a:p>
           <a:p>
             <a:pPr marL="514350" indent="-514350">
@@ -3541,7 +3765,15 @@
             </a:pPr>
             <a:r>
               <a:rPr lang="en-US" dirty="0"/>
-              <a:t>Created simple UI so user can selected and analyze features, then export part for manufacturing	</a:t>
+              <a:t>Created simple UI so user can </a:t>
+            </a:r>
+            <a:r>
+              <a:rPr lang="en-US" dirty="0" smtClean="0"/>
+              <a:t>select </a:t>
+            </a:r>
+            <a:r>
+              <a:rPr lang="en-US" dirty="0"/>
+              <a:t>and analyze features, then export part for manufacturing	</a:t>
             </a:r>
           </a:p>
         </p:txBody>
@@ -3604,31 +3836,35 @@
           </a:p>
         </p:txBody>
       </p:sp>
-      <p:sp>
-        <p:nvSpPr>
-          <p:cNvPr id="5" name="Content Placeholder 4">
-            <a:extLst>
-              <a:ext uri="{FF2B5EF4-FFF2-40B4-BE49-F238E27FC236}">
-                <a16:creationId xmlns:a16="http://schemas.microsoft.com/office/drawing/2014/main" id="{A038BD90-6C4D-4BE5-A813-3CE43E3A9F6C}"/>
-              </a:ext>
-            </a:extLst>
-          </p:cNvPr>
-          <p:cNvSpPr>
-            <a:spLocks noGrp="1"/>
-          </p:cNvSpPr>
+      <p:pic>
+        <p:nvPicPr>
+          <p:cNvPr id="3" name="Content Placeholder 2"/>
+          <p:cNvPicPr>
+            <a:picLocks noGrp="1" noChangeAspect="1"/>
+          </p:cNvPicPr>
           <p:nvPr>
             <p:ph idx="1"/>
           </p:nvPr>
-        </p:nvSpPr>
-        <p:spPr/>
-        <p:txBody>
-          <a:bodyPr/>
-          <a:lstStyle/>
-          <a:p>
-            <a:endParaRPr lang="en-US"/>
-          </a:p>
-        </p:txBody>
-      </p:sp>
+        </p:nvPicPr>
+        <p:blipFill>
+          <a:blip r:embed="rId2">
+            <a:extLst>
+              <a:ext uri="{28A0092B-C50C-407E-A947-70E740481C1C}">
+                <a14:useLocalDpi xmlns:a14="http://schemas.microsoft.com/office/drawing/2010/main" val="0"/>
+              </a:ext>
+            </a:extLst>
+          </a:blip>
+          <a:stretch>
+            <a:fillRect/>
+          </a:stretch>
+        </p:blipFill>
+        <p:spPr>
+          <a:xfrm>
+            <a:off x="3400523" y="549450"/>
+            <a:ext cx="5390954" cy="5941755"/>
+          </a:xfrm>
+        </p:spPr>
+      </p:pic>
     </p:spTree>
     <p:extLst>
       <p:ext uri="{BB962C8B-B14F-4D97-AF65-F5344CB8AC3E}">
@@ -3659,146 +3895,40 @@
           <a:chExt cx="0" cy="0"/>
         </a:xfrm>
       </p:grpSpPr>
-      <p:sp>
-        <p:nvSpPr>
-          <p:cNvPr id="2" name="Title 1">
-            <a:extLst>
-              <a:ext uri="{FF2B5EF4-FFF2-40B4-BE49-F238E27FC236}">
-                <a16:creationId xmlns:a16="http://schemas.microsoft.com/office/drawing/2014/main" id="{C5DAE7CA-9369-48CD-9541-C82E72C2C0C5}"/>
-              </a:ext>
-            </a:extLst>
-          </p:cNvPr>
-          <p:cNvSpPr>
-            <a:spLocks noGrp="1"/>
-          </p:cNvSpPr>
-          <p:nvPr>
-            <p:ph type="title"/>
-          </p:nvPr>
-        </p:nvSpPr>
-        <p:spPr/>
-        <p:txBody>
-          <a:bodyPr/>
-          <a:lstStyle/>
-          <a:p>
-            <a:r>
-              <a:rPr lang="en-US" dirty="0"/>
-              <a:t>Next Steps</a:t>
-            </a:r>
-          </a:p>
-        </p:txBody>
-      </p:sp>
-      <p:sp>
-        <p:nvSpPr>
-          <p:cNvPr id="3" name="Content Placeholder 2">
-            <a:extLst>
-              <a:ext uri="{FF2B5EF4-FFF2-40B4-BE49-F238E27FC236}">
-                <a16:creationId xmlns:a16="http://schemas.microsoft.com/office/drawing/2014/main" id="{D44BE787-6C9A-42E8-B9CA-921D09C037CE}"/>
-              </a:ext>
-            </a:extLst>
-          </p:cNvPr>
-          <p:cNvSpPr>
-            <a:spLocks noGrp="1"/>
-          </p:cNvSpPr>
-          <p:nvPr>
-            <p:ph idx="1"/>
-          </p:nvPr>
-        </p:nvSpPr>
-        <p:spPr/>
-        <p:txBody>
-          <a:bodyPr>
-            <a:normAutofit/>
-          </a:bodyPr>
-          <a:lstStyle/>
-          <a:p>
-            <a:pPr marL="514350" indent="-514350">
-              <a:buFont typeface="+mj-lt"/>
-              <a:buAutoNum type="arabicPeriod"/>
-            </a:pPr>
-            <a:r>
-              <a:rPr lang="en-US" dirty="0"/>
-              <a:t>Access feature-specific information through </a:t>
-            </a:r>
-            <a:r>
-              <a:rPr lang="en-US" dirty="0" err="1"/>
-              <a:t>SolidDna</a:t>
-            </a:r>
-            <a:r>
-              <a:rPr lang="en-US" dirty="0"/>
-              <a:t> (custom API) or the official SolidWorks API.</a:t>
-            </a:r>
-          </a:p>
-          <a:p>
-            <a:pPr lvl="1"/>
-            <a:r>
-              <a:rPr lang="en-US" dirty="0"/>
-              <a:t>This will allow for feature-specific DFM checking</a:t>
-            </a:r>
-          </a:p>
-          <a:p>
-            <a:pPr lvl="1"/>
-            <a:r>
-              <a:rPr lang="en-US" dirty="0"/>
-              <a:t>Goal: make a set of all features, then run through a DFM check function</a:t>
-            </a:r>
-          </a:p>
-          <a:p>
-            <a:pPr lvl="1"/>
-            <a:endParaRPr lang="en-US" dirty="0"/>
-          </a:p>
-          <a:p>
-            <a:pPr marL="514350" indent="-514350">
-              <a:buFont typeface="+mj-lt"/>
-              <a:buAutoNum type="arabicPeriod"/>
-            </a:pPr>
-            <a:r>
-              <a:rPr lang="en-US" dirty="0"/>
-              <a:t>Interface with </a:t>
-            </a:r>
-            <a:r>
-              <a:rPr lang="en-US" dirty="0" err="1"/>
-              <a:t>SculptPrint</a:t>
-            </a:r>
-            <a:endParaRPr lang="en-US" dirty="0"/>
-          </a:p>
-          <a:p>
-            <a:pPr lvl="1"/>
-            <a:r>
-              <a:rPr lang="en-US" dirty="0"/>
-              <a:t>Can we run a python script from within SolidWorks, or will this be external?</a:t>
-            </a:r>
-          </a:p>
-          <a:p>
-            <a:pPr lvl="1"/>
-            <a:r>
-              <a:rPr lang="en-US" dirty="0"/>
-              <a:t>Dynamically show the </a:t>
-            </a:r>
-            <a:r>
-              <a:rPr lang="en-US" dirty="0" err="1"/>
-              <a:t>SculptPrint</a:t>
-            </a:r>
-            <a:r>
-              <a:rPr lang="en-US" dirty="0"/>
-              <a:t> results in the plug-in</a:t>
-            </a:r>
-          </a:p>
-          <a:p>
-            <a:pPr lvl="1"/>
-            <a:endParaRPr lang="en-US" dirty="0"/>
-          </a:p>
-          <a:p>
-            <a:pPr marL="457200" indent="-457200">
-              <a:buFont typeface="+mj-lt"/>
-              <a:buAutoNum type="arabicPeriod"/>
-            </a:pPr>
-            <a:endParaRPr lang="en-US" dirty="0"/>
-          </a:p>
-        </p:txBody>
-      </p:sp>
+      <p:pic>
+        <p:nvPicPr>
+          <p:cNvPr id="14" name="Picture 13"/>
+          <p:cNvPicPr>
+            <a:picLocks noChangeAspect="1"/>
+          </p:cNvPicPr>
+          <p:nvPr/>
+        </p:nvPicPr>
+        <p:blipFill>
+          <a:blip r:embed="rId2">
+            <a:extLst>
+              <a:ext uri="{28A0092B-C50C-407E-A947-70E740481C1C}">
+                <a14:useLocalDpi xmlns:a14="http://schemas.microsoft.com/office/drawing/2010/main" val="0"/>
+              </a:ext>
+            </a:extLst>
+          </a:blip>
+          <a:stretch>
+            <a:fillRect/>
+          </a:stretch>
+        </p:blipFill>
+        <p:spPr>
+          <a:xfrm>
+            <a:off x="2766565" y="0"/>
+            <a:ext cx="6658870" cy="6858000"/>
+          </a:xfrm>
+          <a:prstGeom prst="rect">
+            <a:avLst/>
+          </a:prstGeom>
+        </p:spPr>
+      </p:pic>
     </p:spTree>
     <p:extLst>
       <p:ext uri="{BB962C8B-B14F-4D97-AF65-F5344CB8AC3E}">
-        <p14:creationId xmlns:p14="http://schemas.microsoft.com/office/powerpoint/2010/main" val="2696789135"/>
+        <p14:creationId xmlns:p14="http://schemas.microsoft.com/office/powerpoint/2010/main" val="4074693023"/>
       </p:ext>
     </p:extLst>
   </p:cSld>
@@ -3825,86 +3955,40 @@
           <a:chExt cx="0" cy="0"/>
         </a:xfrm>
       </p:grpSpPr>
-      <p:sp>
-        <p:nvSpPr>
-          <p:cNvPr id="2" name="Title 1">
-            <a:extLst>
-              <a:ext uri="{FF2B5EF4-FFF2-40B4-BE49-F238E27FC236}">
-                <a16:creationId xmlns:a16="http://schemas.microsoft.com/office/drawing/2014/main" id="{74D03DE4-8F63-4CF3-B2F1-D8930A138178}"/>
-              </a:ext>
-            </a:extLst>
-          </p:cNvPr>
-          <p:cNvSpPr>
-            <a:spLocks noGrp="1"/>
-          </p:cNvSpPr>
-          <p:nvPr>
-            <p:ph type="title"/>
-          </p:nvPr>
-        </p:nvSpPr>
-        <p:spPr/>
-        <p:txBody>
-          <a:bodyPr/>
-          <a:lstStyle/>
-          <a:p>
-            <a:r>
-              <a:rPr lang="en-US" dirty="0"/>
-              <a:t>Quick </a:t>
-            </a:r>
-            <a:r>
-              <a:rPr lang="en-US"/>
-              <a:t>Project Decisions</a:t>
-            </a:r>
-            <a:endParaRPr lang="en-US" dirty="0"/>
-          </a:p>
-        </p:txBody>
-      </p:sp>
-      <p:sp>
-        <p:nvSpPr>
-          <p:cNvPr id="3" name="Content Placeholder 2">
-            <a:extLst>
-              <a:ext uri="{FF2B5EF4-FFF2-40B4-BE49-F238E27FC236}">
-                <a16:creationId xmlns:a16="http://schemas.microsoft.com/office/drawing/2014/main" id="{A96EC9EA-A5D4-4E2C-BC85-CEDE3BC1F5E6}"/>
-              </a:ext>
-            </a:extLst>
-          </p:cNvPr>
-          <p:cNvSpPr>
-            <a:spLocks noGrp="1"/>
-          </p:cNvSpPr>
-          <p:nvPr>
-            <p:ph idx="1"/>
-          </p:nvPr>
-        </p:nvSpPr>
-        <p:spPr/>
-        <p:txBody>
-          <a:bodyPr/>
-          <a:lstStyle/>
-          <a:p>
-            <a:r>
-              <a:rPr lang="en-US" dirty="0"/>
-              <a:t>Need a proper name and description to display in SolidWorks</a:t>
-            </a:r>
-          </a:p>
-          <a:p>
-            <a:endParaRPr lang="en-US" dirty="0"/>
-          </a:p>
-          <a:p>
-            <a:r>
-              <a:rPr lang="en-US" dirty="0"/>
-              <a:t>Design desired interface (sketch/draw)</a:t>
-            </a:r>
-          </a:p>
-          <a:p>
-            <a:endParaRPr lang="en-US" dirty="0"/>
-          </a:p>
-          <a:p>
-            <a:endParaRPr lang="en-US" dirty="0"/>
-          </a:p>
-        </p:txBody>
-      </p:sp>
+      <p:pic>
+        <p:nvPicPr>
+          <p:cNvPr id="5" name="Picture 4"/>
+          <p:cNvPicPr>
+            <a:picLocks noChangeAspect="1"/>
+          </p:cNvPicPr>
+          <p:nvPr/>
+        </p:nvPicPr>
+        <p:blipFill>
+          <a:blip r:embed="rId2">
+            <a:extLst>
+              <a:ext uri="{28A0092B-C50C-407E-A947-70E740481C1C}">
+                <a14:useLocalDpi xmlns:a14="http://schemas.microsoft.com/office/drawing/2010/main" val="0"/>
+              </a:ext>
+            </a:extLst>
+          </a:blip>
+          <a:stretch>
+            <a:fillRect/>
+          </a:stretch>
+        </p:blipFill>
+        <p:spPr>
+          <a:xfrm>
+            <a:off x="2268279" y="0"/>
+            <a:ext cx="7655442" cy="6858000"/>
+          </a:xfrm>
+          <a:prstGeom prst="rect">
+            <a:avLst/>
+          </a:prstGeom>
+        </p:spPr>
+      </p:pic>
     </p:spTree>
     <p:extLst>
       <p:ext uri="{BB962C8B-B14F-4D97-AF65-F5344CB8AC3E}">
-        <p14:creationId xmlns:p14="http://schemas.microsoft.com/office/powerpoint/2010/main" val="1983117304"/>
+        <p14:creationId xmlns:p14="http://schemas.microsoft.com/office/powerpoint/2010/main" val="1105560366"/>
       </p:ext>
     </p:extLst>
   </p:cSld>
@@ -3936,7 +4020,7 @@
           <p:cNvPr id="2" name="Title 1">
             <a:extLst>
               <a:ext uri="{FF2B5EF4-FFF2-40B4-BE49-F238E27FC236}">
-                <a16:creationId xmlns:a16="http://schemas.microsoft.com/office/drawing/2014/main" id="{9326EEC7-422E-4A70-8740-43F28C77C875}"/>
+                <a16:creationId xmlns:a16="http://schemas.microsoft.com/office/drawing/2014/main" id="{C5DAE7CA-9369-48CD-9541-C82E72C2C0C5}"/>
               </a:ext>
             </a:extLst>
           </p:cNvPr>
@@ -3954,7 +4038,7 @@
           <a:p>
             <a:r>
               <a:rPr lang="en-US" dirty="0"/>
-              <a:t>Problems List and Solution</a:t>
+              <a:t>Next Steps</a:t>
             </a:r>
           </a:p>
         </p:txBody>
@@ -3964,7 +4048,7 @@
           <p:cNvPr id="3" name="Content Placeholder 2">
             <a:extLst>
               <a:ext uri="{FF2B5EF4-FFF2-40B4-BE49-F238E27FC236}">
-                <a16:creationId xmlns:a16="http://schemas.microsoft.com/office/drawing/2014/main" id="{93D28F83-2A80-45E7-A6A6-C520B1FAEE69}"/>
+                <a16:creationId xmlns:a16="http://schemas.microsoft.com/office/drawing/2014/main" id="{D44BE787-6C9A-42E8-B9CA-921D09C037CE}"/>
               </a:ext>
             </a:extLst>
           </p:cNvPr>
@@ -3977,23 +4061,82 @@
         </p:nvSpPr>
         <p:spPr/>
         <p:txBody>
-          <a:bodyPr/>
-          <a:lstStyle/>
-          <a:p>
+          <a:bodyPr>
+            <a:normAutofit fontScale="92500" lnSpcReduction="20000"/>
+          </a:bodyPr>
+          <a:lstStyle/>
+          <a:p>
+            <a:pPr marL="514350" indent="-514350">
+              <a:buFont typeface="+mj-lt"/>
+              <a:buAutoNum type="arabicPeriod"/>
+            </a:pPr>
             <a:r>
               <a:rPr lang="en-US" dirty="0"/>
-              <a:t>AngelSix Add-In Installer returns with an error</a:t>
+              <a:t>Access feature-specific information through </a:t>
+            </a:r>
+            <a:r>
+              <a:rPr lang="en-US" dirty="0" err="1"/>
+              <a:t>SolidDna</a:t>
+            </a:r>
+            <a:r>
+              <a:rPr lang="en-US" dirty="0"/>
+              <a:t> (custom API) or the official SolidWorks API.</a:t>
             </a:r>
           </a:p>
           <a:p>
             <a:pPr lvl="1"/>
             <a:r>
               <a:rPr lang="en-US" dirty="0"/>
-              <a:t>The add-in installer runs RegAsm.exe to register your plug-in’s .</a:t>
+              <a:t>This will allow for feature-specific DFM </a:t>
+            </a:r>
+            <a:r>
+              <a:rPr lang="en-US" dirty="0" smtClean="0"/>
+              <a:t>checking</a:t>
+            </a:r>
+          </a:p>
+          <a:p>
+            <a:pPr lvl="2"/>
+            <a:r>
+              <a:rPr lang="en-US" dirty="0" smtClean="0"/>
+              <a:t>Extrusion depth, hole depth/radii, </a:t>
+            </a:r>
+            <a:r>
+              <a:rPr lang="en-US" dirty="0" err="1" smtClean="0"/>
+              <a:t>etc</a:t>
+            </a:r>
+            <a:endParaRPr lang="en-US" dirty="0"/>
+          </a:p>
+          <a:p>
+            <a:pPr lvl="1"/>
+            <a:r>
+              <a:rPr lang="en-US" dirty="0"/>
+              <a:t>Goal: make a set of all </a:t>
+            </a:r>
+            <a:r>
+              <a:rPr lang="en-US" dirty="0" smtClean="0"/>
+              <a:t>features and dimensions, </a:t>
+            </a:r>
+            <a:r>
+              <a:rPr lang="en-US" dirty="0"/>
+              <a:t>then run through a DFM check function</a:t>
+            </a:r>
+          </a:p>
+          <a:p>
+            <a:pPr lvl="1"/>
+            <a:endParaRPr lang="en-US" dirty="0"/>
+          </a:p>
+          <a:p>
+            <a:pPr marL="514350" indent="-514350">
+              <a:buFont typeface="+mj-lt"/>
+              <a:buAutoNum type="arabicPeriod"/>
+            </a:pPr>
+            <a:r>
+              <a:rPr lang="en-US" dirty="0"/>
+              <a:t>Interface with </a:t>
             </a:r>
             <a:r>
               <a:rPr lang="en-US" dirty="0" err="1"/>
-              <a:t>dll</a:t>
+              <a:t>SculptPrint</a:t>
             </a:r>
             <a:endParaRPr lang="en-US" dirty="0"/>
           </a:p>
@@ -4001,29 +4144,60 @@
             <a:pPr lvl="1"/>
             <a:r>
               <a:rPr lang="en-US" dirty="0"/>
-              <a:t>Can debug manually</a:t>
+              <a:t>Can we run a python script from within SolidWorks, or will this be external?</a:t>
             </a:r>
           </a:p>
           <a:p>
             <a:pPr lvl="1"/>
             <a:r>
               <a:rPr lang="en-US" dirty="0"/>
-              <a:t>cd C:\Windows\Microsoft.NET\Framework64\v4.0.30319</a:t>
+              <a:t>Dynamically show the </a:t>
+            </a:r>
+            <a:r>
+              <a:rPr lang="en-US" dirty="0" err="1"/>
+              <a:t>SculptPrint</a:t>
+            </a:r>
+            <a:r>
+              <a:rPr lang="en-US" dirty="0"/>
+              <a:t> results in the </a:t>
+            </a:r>
+            <a:r>
+              <a:rPr lang="en-US" dirty="0" smtClean="0"/>
+              <a:t>plug-in</a:t>
             </a:r>
           </a:p>
           <a:p>
             <a:pPr lvl="1"/>
-            <a:r>
-              <a:rPr lang="en-US" dirty="0"/>
-              <a:t>RegAsm.exe /codebase "C:\Users\Aniruddh\Desktop\solidworks-api-develop\Tutorials\DynamicReload\DynamicReload\bin\Debug\DynamicReload.dll"</a:t>
-            </a:r>
+            <a:endParaRPr lang="en-US" dirty="0"/>
+          </a:p>
+          <a:p>
+            <a:pPr marL="514350" indent="-514350">
+              <a:buFont typeface="+mj-lt"/>
+              <a:buAutoNum type="arabicPeriod"/>
+            </a:pPr>
+            <a:r>
+              <a:rPr lang="en-US" dirty="0" smtClean="0"/>
+              <a:t>Document everything thoroughly. This project is confusing to set-up, so I will make a README</a:t>
+            </a:r>
+            <a:endParaRPr lang="en-US" dirty="0"/>
+          </a:p>
+          <a:p>
+            <a:pPr lvl="1"/>
+            <a:endParaRPr lang="en-US" dirty="0"/>
+          </a:p>
+          <a:p>
+            <a:pPr marL="457200" indent="-457200">
+              <a:buFont typeface="+mj-lt"/>
+              <a:buAutoNum type="arabicPeriod"/>
+            </a:pPr>
+            <a:endParaRPr lang="en-US" dirty="0"/>
           </a:p>
         </p:txBody>
       </p:sp>
     </p:spTree>
     <p:extLst>
       <p:ext uri="{BB962C8B-B14F-4D97-AF65-F5344CB8AC3E}">
-        <p14:creationId xmlns:p14="http://schemas.microsoft.com/office/powerpoint/2010/main" val="1357193124"/>
+        <p14:creationId xmlns:p14="http://schemas.microsoft.com/office/powerpoint/2010/main" val="2696789135"/>
       </p:ext>
     </p:extLst>
   </p:cSld>
@@ -4055,7 +4229,7 @@
           <p:cNvPr id="2" name="Title 1">
             <a:extLst>
               <a:ext uri="{FF2B5EF4-FFF2-40B4-BE49-F238E27FC236}">
-                <a16:creationId xmlns:a16="http://schemas.microsoft.com/office/drawing/2014/main" id="{FFD80D3C-0DE5-4787-AD89-FCA2B073CAA9}"/>
+                <a16:creationId xmlns:a16="http://schemas.microsoft.com/office/drawing/2014/main" id="{74D03DE4-8F63-4CF3-B2F1-D8930A138178}"/>
               </a:ext>
             </a:extLst>
           </p:cNvPr>
@@ -4073,8 +4247,13 @@
           <a:p>
             <a:r>
               <a:rPr lang="en-US" dirty="0"/>
-              <a:t>Problems List and Solution (Cont’d)</a:t>
-            </a:r>
+              <a:t>Quick </a:t>
+            </a:r>
+            <a:r>
+              <a:rPr lang="en-US"/>
+              <a:t>Project Decisions</a:t>
+            </a:r>
+            <a:endParaRPr lang="en-US" dirty="0"/>
           </a:p>
         </p:txBody>
       </p:sp>
@@ -4083,7 +4262,7 @@
           <p:cNvPr id="3" name="Content Placeholder 2">
             <a:extLst>
               <a:ext uri="{FF2B5EF4-FFF2-40B4-BE49-F238E27FC236}">
-                <a16:creationId xmlns:a16="http://schemas.microsoft.com/office/drawing/2014/main" id="{77C7C523-BD01-4F5C-ADCB-063CC6B09E70}"/>
+                <a16:creationId xmlns:a16="http://schemas.microsoft.com/office/drawing/2014/main" id="{A96EC9EA-A5D4-4E2C-BC85-CEDE3BC1F5E6}"/>
               </a:ext>
             </a:extLst>
           </p:cNvPr>
@@ -4101,36 +4280,30 @@
           <a:p>
             <a:r>
               <a:rPr lang="en-US" dirty="0"/>
-              <a:t>Packages downloaded from GitHub do not compile because Dna.Framework is not a valid namespace</a:t>
-            </a:r>
-          </a:p>
-          <a:p>
-            <a:pPr lvl="1"/>
+              <a:t>Need a proper name and description to display in SolidWorks</a:t>
+            </a:r>
+          </a:p>
+          <a:p>
+            <a:endParaRPr lang="en-US" dirty="0"/>
+          </a:p>
+          <a:p>
             <a:r>
               <a:rPr lang="en-US" dirty="0"/>
-              <a:t>Dna.Framework, also written by AngelSix, is a NuGet package</a:t>
-            </a:r>
-          </a:p>
-          <a:p>
-            <a:pPr lvl="1"/>
-            <a:r>
-              <a:rPr lang="en-US" dirty="0"/>
-              <a:t>NuGet is a free, open-source package manager in Visual Studio</a:t>
-            </a:r>
-          </a:p>
-          <a:p>
-            <a:pPr lvl="1"/>
-            <a:r>
-              <a:rPr lang="en-US" dirty="0"/>
-              <a:t>Make sure this package is properly installed (with dependencies) for each solution</a:t>
-            </a:r>
+              <a:t>Design desired interface (sketch/draw)</a:t>
+            </a:r>
+          </a:p>
+          <a:p>
+            <a:endParaRPr lang="en-US" dirty="0"/>
+          </a:p>
+          <a:p>
+            <a:endParaRPr lang="en-US" dirty="0"/>
           </a:p>
         </p:txBody>
       </p:sp>
     </p:spTree>
     <p:extLst>
       <p:ext uri="{BB962C8B-B14F-4D97-AF65-F5344CB8AC3E}">
-        <p14:creationId xmlns:p14="http://schemas.microsoft.com/office/powerpoint/2010/main" val="1105893448"/>
+        <p14:creationId xmlns:p14="http://schemas.microsoft.com/office/powerpoint/2010/main" val="1983117304"/>
       </p:ext>
     </p:extLst>
   </p:cSld>
@@ -4162,7 +4335,7 @@
           <p:cNvPr id="2" name="Title 1">
             <a:extLst>
               <a:ext uri="{FF2B5EF4-FFF2-40B4-BE49-F238E27FC236}">
-                <a16:creationId xmlns:a16="http://schemas.microsoft.com/office/drawing/2014/main" id="{5EF4F688-E0AF-4FB6-89E1-31ACE46128F1}"/>
+                <a16:creationId xmlns:a16="http://schemas.microsoft.com/office/drawing/2014/main" id="{9326EEC7-422E-4A70-8740-43F28C77C875}"/>
               </a:ext>
             </a:extLst>
           </p:cNvPr>
@@ -4180,7 +4353,7 @@
           <a:p>
             <a:r>
               <a:rPr lang="en-US" dirty="0"/>
-              <a:t>Problems List and Solution (Cont’d)</a:t>
+              <a:t>Problems List and Solution</a:t>
             </a:r>
           </a:p>
         </p:txBody>
@@ -4190,7 +4363,7 @@
           <p:cNvPr id="3" name="Content Placeholder 2">
             <a:extLst>
               <a:ext uri="{FF2B5EF4-FFF2-40B4-BE49-F238E27FC236}">
-                <a16:creationId xmlns:a16="http://schemas.microsoft.com/office/drawing/2014/main" id="{B4C844F7-E960-4048-BB55-A40BA7FDB0FD}"/>
+                <a16:creationId xmlns:a16="http://schemas.microsoft.com/office/drawing/2014/main" id="{93D28F83-2A80-45E7-A6A6-C520B1FAEE69}"/>
               </a:ext>
             </a:extLst>
           </p:cNvPr>
@@ -4208,16 +4381,40 @@
           <a:p>
             <a:r>
               <a:rPr lang="en-US" dirty="0"/>
-              <a:t>Make sure SolidWorks Interop files (SolidWorks Native API) have the same version as those referenced by AngelSix API</a:t>
-            </a:r>
-          </a:p>
-          <a:p>
+              <a:t>AngelSix Add-In Installer returns with an error</a:t>
+            </a:r>
+          </a:p>
+          <a:p>
+            <a:pPr lvl="1"/>
+            <a:r>
+              <a:rPr lang="en-US" dirty="0"/>
+              <a:t>The add-in installer runs RegAsm.exe to register your plug-in’s .</a:t>
+            </a:r>
+            <a:r>
+              <a:rPr lang="en-US" dirty="0" err="1"/>
+              <a:t>dll</a:t>
+            </a:r>
             <a:endParaRPr lang="en-US" dirty="0"/>
           </a:p>
           <a:p>
+            <a:pPr lvl="1"/>
             <a:r>
               <a:rPr lang="en-US" dirty="0"/>
-              <a:t>AngelSix API uses .NET Framework 4.7.1, so make sure this is consistent with your solution</a:t>
+              <a:t>Can debug manually</a:t>
+            </a:r>
+          </a:p>
+          <a:p>
+            <a:pPr lvl="1"/>
+            <a:r>
+              <a:rPr lang="en-US" dirty="0"/>
+              <a:t>cd C:\Windows\Microsoft.NET\Framework64\v4.0.30319</a:t>
+            </a:r>
+          </a:p>
+          <a:p>
+            <a:pPr lvl="1"/>
+            <a:r>
+              <a:rPr lang="en-US" dirty="0"/>
+              <a:t>RegAsm.exe /codebase "C:\Users\Aniruddh\Desktop\solidworks-api-develop\Tutorials\DynamicReload\DynamicReload\bin\Debug\DynamicReload.dll"</a:t>
             </a:r>
           </a:p>
         </p:txBody>
@@ -4225,7 +4422,114 @@
     </p:spTree>
     <p:extLst>
       <p:ext uri="{BB962C8B-B14F-4D97-AF65-F5344CB8AC3E}">
-        <p14:creationId xmlns:p14="http://schemas.microsoft.com/office/powerpoint/2010/main" val="790591578"/>
+        <p14:creationId xmlns:p14="http://schemas.microsoft.com/office/powerpoint/2010/main" val="1357193124"/>
+      </p:ext>
+    </p:extLst>
+  </p:cSld>
+  <p:clrMapOvr>
+    <a:masterClrMapping/>
+  </p:clrMapOvr>
+</p:sld>
+</file>
+
+<file path=ppt/slides/slide9.xml><?xml version="1.0" encoding="utf-8"?>
+<p:sld xmlns:a="http://schemas.openxmlformats.org/drawingml/2006/main" xmlns:r="http://schemas.openxmlformats.org/officeDocument/2006/relationships" xmlns:p="http://schemas.openxmlformats.org/presentationml/2006/main">
+  <p:cSld>
+    <p:spTree>
+      <p:nvGrpSpPr>
+        <p:cNvPr id="1" name=""/>
+        <p:cNvGrpSpPr/>
+        <p:nvPr/>
+      </p:nvGrpSpPr>
+      <p:grpSpPr>
+        <a:xfrm>
+          <a:off x="0" y="0"/>
+          <a:ext cx="0" cy="0"/>
+          <a:chOff x="0" y="0"/>
+          <a:chExt cx="0" cy="0"/>
+        </a:xfrm>
+      </p:grpSpPr>
+      <p:sp>
+        <p:nvSpPr>
+          <p:cNvPr id="2" name="Title 1">
+            <a:extLst>
+              <a:ext uri="{FF2B5EF4-FFF2-40B4-BE49-F238E27FC236}">
+                <a16:creationId xmlns:a16="http://schemas.microsoft.com/office/drawing/2014/main" id="{FFD80D3C-0DE5-4787-AD89-FCA2B073CAA9}"/>
+              </a:ext>
+            </a:extLst>
+          </p:cNvPr>
+          <p:cNvSpPr>
+            <a:spLocks noGrp="1"/>
+          </p:cNvSpPr>
+          <p:nvPr>
+            <p:ph type="title"/>
+          </p:nvPr>
+        </p:nvSpPr>
+        <p:spPr/>
+        <p:txBody>
+          <a:bodyPr/>
+          <a:lstStyle/>
+          <a:p>
+            <a:r>
+              <a:rPr lang="en-US" dirty="0"/>
+              <a:t>Problems List and Solution (Cont’d)</a:t>
+            </a:r>
+          </a:p>
+        </p:txBody>
+      </p:sp>
+      <p:sp>
+        <p:nvSpPr>
+          <p:cNvPr id="3" name="Content Placeholder 2">
+            <a:extLst>
+              <a:ext uri="{FF2B5EF4-FFF2-40B4-BE49-F238E27FC236}">
+                <a16:creationId xmlns:a16="http://schemas.microsoft.com/office/drawing/2014/main" id="{77C7C523-BD01-4F5C-ADCB-063CC6B09E70}"/>
+              </a:ext>
+            </a:extLst>
+          </p:cNvPr>
+          <p:cNvSpPr>
+            <a:spLocks noGrp="1"/>
+          </p:cNvSpPr>
+          <p:nvPr>
+            <p:ph idx="1"/>
+          </p:nvPr>
+        </p:nvSpPr>
+        <p:spPr/>
+        <p:txBody>
+          <a:bodyPr/>
+          <a:lstStyle/>
+          <a:p>
+            <a:r>
+              <a:rPr lang="en-US" dirty="0"/>
+              <a:t>Packages downloaded from GitHub do not compile because Dna.Framework is not a valid namespace</a:t>
+            </a:r>
+          </a:p>
+          <a:p>
+            <a:pPr lvl="1"/>
+            <a:r>
+              <a:rPr lang="en-US" dirty="0"/>
+              <a:t>Dna.Framework, also written by AngelSix, is a NuGet package</a:t>
+            </a:r>
+          </a:p>
+          <a:p>
+            <a:pPr lvl="1"/>
+            <a:r>
+              <a:rPr lang="en-US" dirty="0"/>
+              <a:t>NuGet is a free, open-source package manager in Visual Studio</a:t>
+            </a:r>
+          </a:p>
+          <a:p>
+            <a:pPr lvl="1"/>
+            <a:r>
+              <a:rPr lang="en-US" dirty="0"/>
+              <a:t>Make sure this package is properly installed (with dependencies) for each solution</a:t>
+            </a:r>
+          </a:p>
+        </p:txBody>
+      </p:sp>
+    </p:spTree>
+    <p:extLst>
+      <p:ext uri="{BB962C8B-B14F-4D97-AF65-F5344CB8AC3E}">
+        <p14:creationId xmlns:p14="http://schemas.microsoft.com/office/powerpoint/2010/main" val="1105893448"/>
       </p:ext>
     </p:extLst>
   </p:cSld>

</xml_diff>

<commit_message>
Feature_Check + Week 2 PPT Updates
</commit_message>
<xml_diff>
--- a/Weekly Updates/Week2.pptx
+++ b/Weekly Updates/Week2.pptx
@@ -3359,6 +3359,10 @@
           </a:bodyPr>
           <a:lstStyle/>
           <a:p>
+            <a:r>
+              <a:rPr lang="en-US" dirty="0"/>
+              <a:t/>
+            </a:r>
             <a:br>
               <a:rPr lang="en-US" dirty="0"/>
             </a:br>

</xml_diff>

<commit_message>
Updated Week 2 PPT
</commit_message>
<xml_diff>
--- a/Weekly Updates/Week2.pptx
+++ b/Weekly Updates/Week2.pptx
@@ -3359,10 +3359,6 @@
           </a:bodyPr>
           <a:lstStyle/>
           <a:p>
-            <a:r>
-              <a:rPr lang="en-US" dirty="0"/>
-              <a:t/>
-            </a:r>
             <a:br>
               <a:rPr lang="en-US" dirty="0"/>
             </a:br>
@@ -3786,7 +3782,7 @@
             </a:r>
             <a:r>
               <a:rPr lang="en-US" dirty="0"/>
-              <a:t> (custom API) and the official SolidWorks API</a:t>
+              <a:t> (custom API) and the official SolidWorks API. More to be done here!</a:t>
             </a:r>
           </a:p>
           <a:p>
@@ -4162,7 +4158,7 @@
             </a:pPr>
             <a:r>
               <a:rPr lang="en-US" dirty="0"/>
-              <a:t>Document everything thoroughly. This project is confusing to set-up, so I will make a README</a:t>
+              <a:t>Document everything thoroughly. This project is confusing to set-up, so I will make a guide</a:t>
             </a:r>
           </a:p>
           <a:p>

</xml_diff>